<commit_message>
Added some changes to PPT file
</commit_message>
<xml_diff>
--- a/PPT and Documentations/groupA136_vis_and_analysis_student_demo.pptx
+++ b/PPT and Documentations/groupA136_vis_and_analysis_student_demo.pptx
@@ -157,14 +157,6 @@
     </p:ext>
   </p:extLst>
 </p:presentation>
-</file>
-
-<file path=ppt/revisionInfo.xml><?xml version="1.0" encoding="utf-8"?>
-<p1510:revInfo xmlns:a="http://schemas.openxmlformats.org/drawingml/2006/main" xmlns:r="http://schemas.openxmlformats.org/officeDocument/2006/relationships" xmlns:p1510="http://schemas.microsoft.com/office/powerpoint/2015/10/main">
-  <p1510:revLst>
-    <p1510:client id="{A408706E-1E55-4BE3-9981-9E9409FA3F0E}" v="1" dt="2025-11-17T15:37:03.158"/>
-  </p1510:revLst>
-</p1510:revInfo>
 </file>
 
 <file path=ppt/handoutMasters/handoutMaster1.xml><?xml version="1.0" encoding="utf-8"?>
@@ -5342,14 +5334,19 @@
             <p:ph type="subTitle" idx="1"/>
           </p:nvPr>
         </p:nvSpPr>
-        <p:spPr/>
+        <p:spPr>
+          <a:xfrm>
+            <a:off x="954000" y="1890000"/>
+            <a:ext cx="10567440" cy="360000"/>
+          </a:xfrm>
+        </p:spPr>
         <p:txBody>
           <a:bodyPr/>
           <a:lstStyle/>
           <a:p>
             <a:r>
               <a:rPr lang="en-US" sz="2000" dirty="0"/>
-              <a:t>Group Id: A 136                                                          Name of Student Presenting: </a:t>
+              <a:t>Group Id: A 136                                                          Name of Student Presenting:  Aroosha Rasheed</a:t>
             </a:r>
           </a:p>
         </p:txBody>
@@ -5786,7 +5783,7 @@
             </a:pPr>
             <a:r>
               <a:rPr lang="en-US" sz="2400" dirty="0"/>
-              <a:t># Independent T-Test</a:t>
+              <a:t># Independent T-Test – not required but used for validation</a:t>
             </a:r>
           </a:p>
           <a:p>
@@ -6519,7 +6516,7 @@
         <p:spPr>
           <a:xfrm>
             <a:off x="827188" y="906120"/>
-            <a:ext cx="11066988" cy="4893647"/>
+            <a:ext cx="11066988" cy="5262979"/>
           </a:xfrm>
           <a:prstGeom prst="rect">
             <a:avLst/>
@@ -6568,10 +6565,16 @@
                 </a:solidFill>
                 <a:latin typeface="+mj-lt"/>
               </a:rPr>
-              <a:t>&lt; 0.05?</a:t>
-            </a:r>
-          </a:p>
-          <a:p>
+              <a:t>&lt; 0.05 </a:t>
+            </a:r>
+            <a:r>
+              <a:rPr lang="en-US" sz="2400" spc="-202" dirty="0">
+                <a:solidFill>
+                  <a:srgbClr val="203232"/>
+                </a:solidFill>
+              </a:rPr>
+              <a:t>(The result is significant)</a:t>
+            </a:r>
             <a:endParaRPr lang="en-US" sz="2400" b="0" strike="noStrike" spc="-202" dirty="0">
               <a:solidFill>
                 <a:srgbClr val="203232"/>
@@ -6580,6 +6583,14 @@
             </a:endParaRPr>
           </a:p>
           <a:p>
+            <a:endParaRPr lang="en-US" sz="2400" b="0" strike="noStrike" spc="-202" dirty="0">
+              <a:solidFill>
+                <a:srgbClr val="203232"/>
+              </a:solidFill>
+              <a:latin typeface="+mj-lt"/>
+            </a:endParaRPr>
+          </a:p>
+          <a:p>
             <a:pPr marL="285750" indent="-285750">
               <a:buFont typeface="Arial" panose="020B0604020202020204" pitchFamily="34" charset="0"/>
               <a:buChar char="•"/>
@@ -6609,7 +6620,7 @@
                 </a:solidFill>
                 <a:latin typeface="+mj-lt"/>
               </a:rPr>
-              <a:t> difference in the mean/median of the student academic score (CGPA) among depressed and non-depressed students. ​</a:t>
+              <a:t> difference in the mean/median of the student academic score (CGPA) among depressed and non-depressed students in India. ​</a:t>
             </a:r>
             <a:br>
               <a:rPr lang="en-US" sz="2400" dirty="0">
@@ -6643,7 +6654,7 @@
                 </a:solidFill>
                 <a:latin typeface="+mj-lt"/>
               </a:rPr>
-              <a:t>Alt hypothesis (H1): There is a difference in the median CGPA between depressed and non-depressed students.​</a:t>
+              <a:t>Alt hypothesis (H1): There is a difference in the median CGPA between depressed and non-depressed students in India.​</a:t>
             </a:r>
           </a:p>
           <a:p>
@@ -6670,7 +6681,7 @@
                 </a:solidFill>
                 <a:latin typeface="+mj-lt"/>
               </a:rPr>
-              <a:t>Reject the null hypothesis   (The result is significant)</a:t>
+              <a:t>Reject the null hypothesis</a:t>
             </a:r>
           </a:p>
           <a:p>
@@ -6706,7 +6717,7 @@
               <a:rPr lang="en-US" sz="2400" dirty="0">
                 <a:latin typeface="+mj-lt"/>
               </a:rPr>
-              <a:t> a statistically significant difference in mean CGPA between depressed and non-depressed students.</a:t>
+              <a:t> a statistically significant difference in mean CGPA between depressed and non-depressed students in India.</a:t>
             </a:r>
             <a:endParaRPr lang="en-US" sz="2400" spc="-202" dirty="0">
               <a:solidFill>
@@ -7701,7 +7712,7 @@
         </p:nvSpPr>
         <p:spPr>
           <a:xfrm>
-            <a:off x="965289" y="1476174"/>
+            <a:off x="965289" y="1034819"/>
             <a:ext cx="10567950" cy="360000"/>
           </a:xfrm>
         </p:spPr>
@@ -7711,7 +7722,7 @@
           <a:p>
             <a:r>
               <a:rPr lang="en-US" sz="2800" dirty="0"/>
-              <a:t>Difference in mean/median for depressed/non-depressed students</a:t>
+              <a:t>Difference in mean/median CGPA for depressed/non-depressed students in India</a:t>
             </a:r>
             <a:endParaRPr lang="en-GB" sz="2800" dirty="0"/>
           </a:p>

</xml_diff>